<commit_message>
fix: fix y-axis in illustration
</commit_message>
<xml_diff>
--- a/docs/WeeklyUpdates/WeeklyUpdate_Mar29-Apr2.pptx
+++ b/docs/WeeklyUpdates/WeeklyUpdate_Mar29-Apr2.pptx
@@ -1326,8 +1326,8 @@
         </a:p>
       </dgm:t>
     </dgm:pt>
-    <mc:AlternateContent xmlns:mc="http://schemas.openxmlformats.org/markup-compatibility/2006">
-      <mc:Choice xmlns:a14="http://schemas.microsoft.com/office/drawing/2010/main" Requires="a14">
+    <mc:AlternateContent xmlns:mc="http://schemas.openxmlformats.org/markup-compatibility/2006" xmlns:a14="http://schemas.microsoft.com/office/drawing/2010/main">
+      <mc:Choice Requires="a14">
         <dgm:pt modelId="{0371B5F3-8D9D-134B-B584-93100FB0DC71}">
           <dgm:prSet phldrT="[Text]" custT="1"/>
           <dgm:spPr/>
@@ -1447,7 +1447,7 @@
           </dgm:t>
         </dgm:pt>
       </mc:Choice>
-      <mc:Fallback>
+      <mc:Fallback xmlns="">
         <dgm:pt modelId="{0371B5F3-8D9D-134B-B584-93100FB0DC71}">
           <dgm:prSet phldrT="[Text]" custT="1"/>
           <dgm:spPr/>
@@ -5187,7 +5187,7 @@
           <a:p>
             <a:fld id="{435793A2-C00B-48F1-8F7C-3BE850BB26D7}" type="datetimeFigureOut">
               <a:rPr lang="en-US" smtClean="0"/>
-              <a:t>4/2/21</a:t>
+              <a:t>4/15/21</a:t>
             </a:fld>
             <a:endParaRPr lang="en-US"/>
           </a:p>
@@ -9954,8 +9954,8 @@
           </a:p>
         </p:txBody>
       </p:sp>
-      <mc:AlternateContent xmlns:mc="http://schemas.openxmlformats.org/markup-compatibility/2006">
-        <mc:Choice xmlns:a14="http://schemas.microsoft.com/office/drawing/2010/main" Requires="a14">
+      <mc:AlternateContent xmlns:mc="http://schemas.openxmlformats.org/markup-compatibility/2006" xmlns:a14="http://schemas.microsoft.com/office/drawing/2010/main">
+        <mc:Choice Requires="a14">
           <p:graphicFrame>
             <p:nvGraphicFramePr>
               <p:cNvPr id="5" name="Content Placeholder 4">
@@ -9988,7 +9988,7 @@
             </a:graphic>
           </p:graphicFrame>
         </mc:Choice>
-        <mc:Fallback>
+        <mc:Fallback xmlns="">
           <p:graphicFrame>
             <p:nvGraphicFramePr>
               <p:cNvPr id="5" name="Content Placeholder 4">
@@ -10016,7 +10016,7 @@
             </p:xfrm>
             <a:graphic>
               <a:graphicData uri="http://schemas.openxmlformats.org/drawingml/2006/diagram">
-                <dgm:relIds xmlns:dgm="http://schemas.openxmlformats.org/drawingml/2006/diagram" xmlns:r="http://schemas.openxmlformats.org/officeDocument/2006/relationships" r:dm="rId7" r:lo="rId3" r:qs="rId4" r:cs="rId5"/>
+                <dgm:relIds xmlns:dgm="http://schemas.openxmlformats.org/drawingml/2006/diagram" xmlns:r="http://schemas.openxmlformats.org/officeDocument/2006/relationships" r:dm="rId7" r:lo="rId8" r:qs="rId9" r:cs="rId10"/>
               </a:graphicData>
             </a:graphic>
           </p:graphicFrame>
@@ -10176,10 +10176,10 @@
         </p:nvGrpSpPr>
         <p:grpSpPr>
           <a:xfrm>
-            <a:off x="5029200" y="2975073"/>
-            <a:ext cx="930809" cy="1628840"/>
-            <a:chOff x="5040418" y="2975073"/>
-            <a:chExt cx="930809" cy="1628840"/>
+            <a:off x="5181600" y="2951993"/>
+            <a:ext cx="1349514" cy="1353139"/>
+            <a:chOff x="5195666" y="2975073"/>
+            <a:chExt cx="1349514" cy="1353139"/>
           </a:xfrm>
         </p:grpSpPr>
         <p:cxnSp>
@@ -10239,9 +10239,9 @@
             <p:nvPr/>
           </p:nvCxnSpPr>
           <p:spPr>
-            <a:xfrm flipH="1">
-              <a:off x="5298844" y="3842703"/>
-              <a:ext cx="555956" cy="20560"/>
+            <a:xfrm>
+              <a:off x="5854800" y="3842703"/>
+              <a:ext cx="583415" cy="0"/>
             </a:xfrm>
             <a:prstGeom prst="straightConnector1">
               <a:avLst/>
@@ -10326,7 +10326,7 @@
           </p:nvSpPr>
           <p:spPr>
             <a:xfrm>
-              <a:off x="5272920" y="4234581"/>
+              <a:off x="5195666" y="3833080"/>
               <a:ext cx="434734" cy="369332"/>
             </a:xfrm>
             <a:prstGeom prst="rect">
@@ -10373,7 +10373,7 @@
           </p:nvSpPr>
           <p:spPr>
             <a:xfrm>
-              <a:off x="5040418" y="3812315"/>
+              <a:off x="6110446" y="3825584"/>
               <a:ext cx="434734" cy="369332"/>
             </a:xfrm>
             <a:prstGeom prst="rect">
@@ -11045,7 +11045,7 @@
         </p:nvSpPr>
         <p:spPr>
           <a:xfrm>
-            <a:off x="2697499" y="1160357"/>
+            <a:off x="2697499" y="1151435"/>
             <a:ext cx="5574607" cy="3496765"/>
           </a:xfrm>
           <a:prstGeom prst="rect">
@@ -11362,7 +11362,7 @@
         </p:blipFill>
         <p:spPr>
           <a:xfrm>
-            <a:off x="4767020" y="2586318"/>
+            <a:off x="4763609" y="2590800"/>
             <a:ext cx="2077647" cy="1955850"/>
           </a:xfrm>
           <a:prstGeom prst="rect">

</xml_diff>